<commit_message>
Corrected logistic regression slide
</commit_message>
<xml_diff>
--- a/Presentation.pptx
+++ b/Presentation.pptx
@@ -133,9 +133,778 @@
 <file path=ppt/revisionInfo.xml><?xml version="1.0" encoding="utf-8"?>
 <p1510:revInfo xmlns:a="http://schemas.openxmlformats.org/drawingml/2006/main" xmlns:r="http://schemas.openxmlformats.org/officeDocument/2006/relationships" xmlns:p1510="http://schemas.microsoft.com/office/powerpoint/2015/10/main">
   <p1510:revLst>
-    <p1510:client id="{EC3E304A-B240-4313-A5FB-A0B824220E39}" v="6" dt="2022-12-12T13:36:22.147"/>
+    <p1510:client id="{EC3E304A-B240-4313-A5FB-A0B824220E39}" v="56" dt="2022-12-12T19:15:46.219"/>
   </p1510:revLst>
 </p1510:revInfo>
+</file>
+
+<file path=ppt/changesInfos/changesInfo1.xml><?xml version="1.0" encoding="utf-8"?>
+<pc:chgInfo xmlns:a="http://schemas.openxmlformats.org/drawingml/2006/main" xmlns:r="http://schemas.openxmlformats.org/officeDocument/2006/relationships" xmlns:ac="http://schemas.microsoft.com/office/drawing/2013/main/command" xmlns:pc="http://schemas.microsoft.com/office/powerpoint/2013/main/command">
+  <pc:docChgLst>
+    <pc:chgData name="Fairbairn, Grant" userId="70424cfb-53ea-4f6b-b8b5-bf19ee344a25" providerId="ADAL" clId="{EC3E304A-B240-4313-A5FB-A0B824220E39}"/>
+    <pc:docChg chg="modSld">
+      <pc:chgData name="Fairbairn, Grant" userId="70424cfb-53ea-4f6b-b8b5-bf19ee344a25" providerId="ADAL" clId="{EC3E304A-B240-4313-A5FB-A0B824220E39}" dt="2022-12-12T19:15:46.219" v="42"/>
+      <pc:docMkLst>
+        <pc:docMk/>
+      </pc:docMkLst>
+      <pc:sldChg chg="addSp delSp modSp modTransition modAnim">
+        <pc:chgData name="Fairbairn, Grant" userId="70424cfb-53ea-4f6b-b8b5-bf19ee344a25" providerId="ADAL" clId="{EC3E304A-B240-4313-A5FB-A0B824220E39}" dt="2022-12-12T19:15:46.219" v="42"/>
+        <pc:sldMkLst>
+          <pc:docMk/>
+          <pc:sldMk cId="0" sldId="256"/>
+        </pc:sldMkLst>
+        <pc:picChg chg="add del mod">
+          <ac:chgData name="Fairbairn, Grant" userId="70424cfb-53ea-4f6b-b8b5-bf19ee344a25" providerId="ADAL" clId="{EC3E304A-B240-4313-A5FB-A0B824220E39}" dt="2022-12-12T15:41:53.164" v="1"/>
+          <ac:picMkLst>
+            <pc:docMk/>
+            <pc:sldMk cId="0" sldId="256"/>
+            <ac:picMk id="2" creationId="{53A2A789-B472-22A0-691C-0727613094CD}"/>
+          </ac:picMkLst>
+        </pc:picChg>
+        <pc:picChg chg="add del mod">
+          <ac:chgData name="Fairbairn, Grant" userId="70424cfb-53ea-4f6b-b8b5-bf19ee344a25" providerId="ADAL" clId="{EC3E304A-B240-4313-A5FB-A0B824220E39}" dt="2022-12-12T16:49:13.281" v="3"/>
+          <ac:picMkLst>
+            <pc:docMk/>
+            <pc:sldMk cId="0" sldId="256"/>
+            <ac:picMk id="3" creationId="{1418D28D-02C4-895A-2402-EA915EC9D8D1}"/>
+          </ac:picMkLst>
+        </pc:picChg>
+        <pc:picChg chg="add del mod">
+          <ac:chgData name="Fairbairn, Grant" userId="70424cfb-53ea-4f6b-b8b5-bf19ee344a25" providerId="ADAL" clId="{EC3E304A-B240-4313-A5FB-A0B824220E39}" dt="2022-12-12T17:11:12.432" v="16"/>
+          <ac:picMkLst>
+            <pc:docMk/>
+            <pc:sldMk cId="0" sldId="256"/>
+            <ac:picMk id="4" creationId="{9243194B-ADC3-BFDF-AD17-6D1290752B0B}"/>
+          </ac:picMkLst>
+        </pc:picChg>
+        <pc:picChg chg="add del mod">
+          <ac:chgData name="Fairbairn, Grant" userId="70424cfb-53ea-4f6b-b8b5-bf19ee344a25" providerId="ADAL" clId="{EC3E304A-B240-4313-A5FB-A0B824220E39}" dt="2022-12-12T17:27:09.412" v="20"/>
+          <ac:picMkLst>
+            <pc:docMk/>
+            <pc:sldMk cId="0" sldId="256"/>
+            <ac:picMk id="5" creationId="{A764620B-F7CE-3B35-DD64-3E1E88D41BF5}"/>
+          </ac:picMkLst>
+        </pc:picChg>
+        <pc:picChg chg="add del mod">
+          <ac:chgData name="Fairbairn, Grant" userId="70424cfb-53ea-4f6b-b8b5-bf19ee344a25" providerId="ADAL" clId="{EC3E304A-B240-4313-A5FB-A0B824220E39}" dt="2022-12-12T17:43:05.408" v="28"/>
+          <ac:picMkLst>
+            <pc:docMk/>
+            <pc:sldMk cId="0" sldId="256"/>
+            <ac:picMk id="6" creationId="{F6A4DD89-32FE-34B4-1752-08F46CF7239D}"/>
+          </ac:picMkLst>
+        </pc:picChg>
+        <pc:picChg chg="add del mod">
+          <ac:chgData name="Fairbairn, Grant" userId="70424cfb-53ea-4f6b-b8b5-bf19ee344a25" providerId="ADAL" clId="{EC3E304A-B240-4313-A5FB-A0B824220E39}" dt="2022-12-12T17:43:20.315" v="30"/>
+          <ac:picMkLst>
+            <pc:docMk/>
+            <pc:sldMk cId="0" sldId="256"/>
+            <ac:picMk id="7" creationId="{1C41D4A1-073C-4C7E-7889-B442C1F2A915}"/>
+          </ac:picMkLst>
+        </pc:picChg>
+        <pc:picChg chg="add del mod">
+          <ac:chgData name="Fairbairn, Grant" userId="70424cfb-53ea-4f6b-b8b5-bf19ee344a25" providerId="ADAL" clId="{EC3E304A-B240-4313-A5FB-A0B824220E39}" dt="2022-12-12T17:58:23.968" v="32"/>
+          <ac:picMkLst>
+            <pc:docMk/>
+            <pc:sldMk cId="0" sldId="256"/>
+            <ac:picMk id="8" creationId="{B0D442F0-8E74-9CAA-1BAC-A70092B8C730}"/>
+          </ac:picMkLst>
+        </pc:picChg>
+        <pc:picChg chg="add del mod">
+          <ac:chgData name="Fairbairn, Grant" userId="70424cfb-53ea-4f6b-b8b5-bf19ee344a25" providerId="ADAL" clId="{EC3E304A-B240-4313-A5FB-A0B824220E39}" dt="2022-12-12T18:00:12.044" v="34"/>
+          <ac:picMkLst>
+            <pc:docMk/>
+            <pc:sldMk cId="0" sldId="256"/>
+            <ac:picMk id="9" creationId="{B142DAB0-8391-F0CC-872B-899622825017}"/>
+          </ac:picMkLst>
+        </pc:picChg>
+        <pc:picChg chg="add del mod">
+          <ac:chgData name="Fairbairn, Grant" userId="70424cfb-53ea-4f6b-b8b5-bf19ee344a25" providerId="ADAL" clId="{EC3E304A-B240-4313-A5FB-A0B824220E39}" dt="2022-12-12T18:01:07.662" v="36"/>
+          <ac:picMkLst>
+            <pc:docMk/>
+            <pc:sldMk cId="0" sldId="256"/>
+            <ac:picMk id="10" creationId="{F177C274-2B9A-FCE9-AF39-D9DCD4FD8F78}"/>
+          </ac:picMkLst>
+        </pc:picChg>
+        <pc:picChg chg="add del mod">
+          <ac:chgData name="Fairbairn, Grant" userId="70424cfb-53ea-4f6b-b8b5-bf19ee344a25" providerId="ADAL" clId="{EC3E304A-B240-4313-A5FB-A0B824220E39}" dt="2022-12-12T19:15:46.219" v="42"/>
+          <ac:picMkLst>
+            <pc:docMk/>
+            <pc:sldMk cId="0" sldId="256"/>
+            <ac:picMk id="11" creationId="{FF66ED2D-7DE5-D1B9-AE69-2AAD39744482}"/>
+          </ac:picMkLst>
+        </pc:picChg>
+      </pc:sldChg>
+      <pc:sldChg chg="addSp delSp modSp modTransition modAnim">
+        <pc:chgData name="Fairbairn, Grant" userId="70424cfb-53ea-4f6b-b8b5-bf19ee344a25" providerId="ADAL" clId="{EC3E304A-B240-4313-A5FB-A0B824220E39}" dt="2022-12-12T19:15:46.219" v="42"/>
+        <pc:sldMkLst>
+          <pc:docMk/>
+          <pc:sldMk cId="0" sldId="258"/>
+        </pc:sldMkLst>
+        <pc:picChg chg="add del mod">
+          <ac:chgData name="Fairbairn, Grant" userId="70424cfb-53ea-4f6b-b8b5-bf19ee344a25" providerId="ADAL" clId="{EC3E304A-B240-4313-A5FB-A0B824220E39}" dt="2022-12-12T15:41:53.164" v="1"/>
+          <ac:picMkLst>
+            <pc:docMk/>
+            <pc:sldMk cId="0" sldId="258"/>
+            <ac:picMk id="3" creationId="{746A7FD2-85CC-2F6A-01B5-D9271AAFEC08}"/>
+          </ac:picMkLst>
+        </pc:picChg>
+        <pc:picChg chg="add del mod">
+          <ac:chgData name="Fairbairn, Grant" userId="70424cfb-53ea-4f6b-b8b5-bf19ee344a25" providerId="ADAL" clId="{EC3E304A-B240-4313-A5FB-A0B824220E39}" dt="2022-12-12T16:49:13.281" v="3"/>
+          <ac:picMkLst>
+            <pc:docMk/>
+            <pc:sldMk cId="0" sldId="258"/>
+            <ac:picMk id="4" creationId="{C6785A98-1903-8458-9CD8-E8EF9513A0BF}"/>
+          </ac:picMkLst>
+        </pc:picChg>
+        <pc:picChg chg="add del mod">
+          <ac:chgData name="Fairbairn, Grant" userId="70424cfb-53ea-4f6b-b8b5-bf19ee344a25" providerId="ADAL" clId="{EC3E304A-B240-4313-A5FB-A0B824220E39}" dt="2022-12-12T17:10:35.711" v="13"/>
+          <ac:picMkLst>
+            <pc:docMk/>
+            <pc:sldMk cId="0" sldId="258"/>
+            <ac:picMk id="5" creationId="{4A1137B3-8797-5E65-EA98-EDDA3D4F4FB7}"/>
+          </ac:picMkLst>
+        </pc:picChg>
+        <pc:picChg chg="add del mod">
+          <ac:chgData name="Fairbairn, Grant" userId="70424cfb-53ea-4f6b-b8b5-bf19ee344a25" providerId="ADAL" clId="{EC3E304A-B240-4313-A5FB-A0B824220E39}" dt="2022-12-12T17:11:03.973" v="15"/>
+          <ac:picMkLst>
+            <pc:docMk/>
+            <pc:sldMk cId="0" sldId="258"/>
+            <ac:picMk id="6" creationId="{DC8610B3-0828-635E-979C-2BD259A89164}"/>
+          </ac:picMkLst>
+        </pc:picChg>
+        <pc:picChg chg="add del mod">
+          <ac:chgData name="Fairbairn, Grant" userId="70424cfb-53ea-4f6b-b8b5-bf19ee344a25" providerId="ADAL" clId="{EC3E304A-B240-4313-A5FB-A0B824220E39}" dt="2022-12-12T17:27:09.412" v="20"/>
+          <ac:picMkLst>
+            <pc:docMk/>
+            <pc:sldMk cId="0" sldId="258"/>
+            <ac:picMk id="7" creationId="{FC8C89BA-882F-234D-B08D-B121BE1F9412}"/>
+          </ac:picMkLst>
+        </pc:picChg>
+        <pc:picChg chg="add del mod">
+          <ac:chgData name="Fairbairn, Grant" userId="70424cfb-53ea-4f6b-b8b5-bf19ee344a25" providerId="ADAL" clId="{EC3E304A-B240-4313-A5FB-A0B824220E39}" dt="2022-12-12T17:43:05.408" v="28"/>
+          <ac:picMkLst>
+            <pc:docMk/>
+            <pc:sldMk cId="0" sldId="258"/>
+            <ac:picMk id="8" creationId="{9F1D7F82-A1AB-2A9F-CE84-143338FA97E9}"/>
+          </ac:picMkLst>
+        </pc:picChg>
+        <pc:picChg chg="add del mod">
+          <ac:chgData name="Fairbairn, Grant" userId="70424cfb-53ea-4f6b-b8b5-bf19ee344a25" providerId="ADAL" clId="{EC3E304A-B240-4313-A5FB-A0B824220E39}" dt="2022-12-12T17:58:23.968" v="32"/>
+          <ac:picMkLst>
+            <pc:docMk/>
+            <pc:sldMk cId="0" sldId="258"/>
+            <ac:picMk id="9" creationId="{328E1D86-65C4-285B-7468-DA3C292FE9A8}"/>
+          </ac:picMkLst>
+        </pc:picChg>
+        <pc:picChg chg="add del mod">
+          <ac:chgData name="Fairbairn, Grant" userId="70424cfb-53ea-4f6b-b8b5-bf19ee344a25" providerId="ADAL" clId="{EC3E304A-B240-4313-A5FB-A0B824220E39}" dt="2022-12-12T18:01:07.662" v="36"/>
+          <ac:picMkLst>
+            <pc:docMk/>
+            <pc:sldMk cId="0" sldId="258"/>
+            <ac:picMk id="10" creationId="{959F25CA-5A91-CA3C-944E-CE96C724F09C}"/>
+          </ac:picMkLst>
+        </pc:picChg>
+        <pc:picChg chg="add del mod">
+          <ac:chgData name="Fairbairn, Grant" userId="70424cfb-53ea-4f6b-b8b5-bf19ee344a25" providerId="ADAL" clId="{EC3E304A-B240-4313-A5FB-A0B824220E39}" dt="2022-12-12T19:15:46.219" v="42"/>
+          <ac:picMkLst>
+            <pc:docMk/>
+            <pc:sldMk cId="0" sldId="258"/>
+            <ac:picMk id="11" creationId="{50728586-40AB-AC61-BCF3-C360D0D4AAA8}"/>
+          </ac:picMkLst>
+        </pc:picChg>
+        <pc:inkChg chg="add del">
+          <ac:chgData name="Fairbairn, Grant" userId="70424cfb-53ea-4f6b-b8b5-bf19ee344a25" providerId="ADAL" clId="{EC3E304A-B240-4313-A5FB-A0B824220E39}" dt="2022-12-12T15:41:53.164" v="1"/>
+          <ac:inkMkLst>
+            <pc:docMk/>
+            <pc:sldMk cId="0" sldId="258"/>
+            <ac:inkMk id="2" creationId="{065612E6-E34B-369F-D17F-D973C7EB13C0}"/>
+          </ac:inkMkLst>
+        </pc:inkChg>
+      </pc:sldChg>
+      <pc:sldChg chg="addSp delSp modSp modTransition modAnim">
+        <pc:chgData name="Fairbairn, Grant" userId="70424cfb-53ea-4f6b-b8b5-bf19ee344a25" providerId="ADAL" clId="{EC3E304A-B240-4313-A5FB-A0B824220E39}" dt="2022-12-12T19:15:46.219" v="42"/>
+        <pc:sldMkLst>
+          <pc:docMk/>
+          <pc:sldMk cId="0" sldId="262"/>
+        </pc:sldMkLst>
+        <pc:picChg chg="add del mod">
+          <ac:chgData name="Fairbairn, Grant" userId="70424cfb-53ea-4f6b-b8b5-bf19ee344a25" providerId="ADAL" clId="{EC3E304A-B240-4313-A5FB-A0B824220E39}" dt="2022-12-12T16:49:13.281" v="3"/>
+          <ac:picMkLst>
+            <pc:docMk/>
+            <pc:sldMk cId="0" sldId="262"/>
+            <ac:picMk id="3" creationId="{E4F4E550-7A38-2419-E680-C012E6EBF7E5}"/>
+          </ac:picMkLst>
+        </pc:picChg>
+        <pc:picChg chg="add del mod">
+          <ac:chgData name="Fairbairn, Grant" userId="70424cfb-53ea-4f6b-b8b5-bf19ee344a25" providerId="ADAL" clId="{EC3E304A-B240-4313-A5FB-A0B824220E39}" dt="2022-12-12T17:27:09.412" v="20"/>
+          <ac:picMkLst>
+            <pc:docMk/>
+            <pc:sldMk cId="0" sldId="262"/>
+            <ac:picMk id="5" creationId="{344F87AF-5D4F-CCBF-9C25-3EF86B03AD4C}"/>
+          </ac:picMkLst>
+        </pc:picChg>
+        <pc:picChg chg="add del mod">
+          <ac:chgData name="Fairbairn, Grant" userId="70424cfb-53ea-4f6b-b8b5-bf19ee344a25" providerId="ADAL" clId="{EC3E304A-B240-4313-A5FB-A0B824220E39}" dt="2022-12-12T17:43:05.408" v="28"/>
+          <ac:picMkLst>
+            <pc:docMk/>
+            <pc:sldMk cId="0" sldId="262"/>
+            <ac:picMk id="6" creationId="{1E2D6180-ADC0-E0BC-8B1B-78E95C5C9A9E}"/>
+          </ac:picMkLst>
+        </pc:picChg>
+        <pc:picChg chg="add del mod">
+          <ac:chgData name="Fairbairn, Grant" userId="70424cfb-53ea-4f6b-b8b5-bf19ee344a25" providerId="ADAL" clId="{EC3E304A-B240-4313-A5FB-A0B824220E39}" dt="2022-12-12T17:58:23.968" v="32"/>
+          <ac:picMkLst>
+            <pc:docMk/>
+            <pc:sldMk cId="0" sldId="262"/>
+            <ac:picMk id="7" creationId="{DF343E33-5E6A-895D-EA32-C0041C73AF73}"/>
+          </ac:picMkLst>
+        </pc:picChg>
+        <pc:picChg chg="add del mod">
+          <ac:chgData name="Fairbairn, Grant" userId="70424cfb-53ea-4f6b-b8b5-bf19ee344a25" providerId="ADAL" clId="{EC3E304A-B240-4313-A5FB-A0B824220E39}" dt="2022-12-12T19:15:46.219" v="42"/>
+          <ac:picMkLst>
+            <pc:docMk/>
+            <pc:sldMk cId="0" sldId="262"/>
+            <ac:picMk id="8" creationId="{3AFCA26B-9BD1-14DD-B770-7B0317AEEBF0}"/>
+          </ac:picMkLst>
+        </pc:picChg>
+      </pc:sldChg>
+      <pc:sldChg chg="addSp delSp modSp modTransition modAnim">
+        <pc:chgData name="Fairbairn, Grant" userId="70424cfb-53ea-4f6b-b8b5-bf19ee344a25" providerId="ADAL" clId="{EC3E304A-B240-4313-A5FB-A0B824220E39}" dt="2022-12-12T19:15:46.219" v="42"/>
+        <pc:sldMkLst>
+          <pc:docMk/>
+          <pc:sldMk cId="0" sldId="263"/>
+        </pc:sldMkLst>
+        <pc:picChg chg="add del mod">
+          <ac:chgData name="Fairbairn, Grant" userId="70424cfb-53ea-4f6b-b8b5-bf19ee344a25" providerId="ADAL" clId="{EC3E304A-B240-4313-A5FB-A0B824220E39}" dt="2022-12-12T16:49:13.281" v="3"/>
+          <ac:picMkLst>
+            <pc:docMk/>
+            <pc:sldMk cId="0" sldId="263"/>
+            <ac:picMk id="3" creationId="{73EAC612-0A3E-6B6E-68EF-50BBA162CB6F}"/>
+          </ac:picMkLst>
+        </pc:picChg>
+        <pc:picChg chg="add del mod">
+          <ac:chgData name="Fairbairn, Grant" userId="70424cfb-53ea-4f6b-b8b5-bf19ee344a25" providerId="ADAL" clId="{EC3E304A-B240-4313-A5FB-A0B824220E39}" dt="2022-12-12T17:27:09.412" v="20"/>
+          <ac:picMkLst>
+            <pc:docMk/>
+            <pc:sldMk cId="0" sldId="263"/>
+            <ac:picMk id="4" creationId="{6D4A37BE-0FFB-A86D-2A28-E108B1C84E25}"/>
+          </ac:picMkLst>
+        </pc:picChg>
+        <pc:picChg chg="add del mod">
+          <ac:chgData name="Fairbairn, Grant" userId="70424cfb-53ea-4f6b-b8b5-bf19ee344a25" providerId="ADAL" clId="{EC3E304A-B240-4313-A5FB-A0B824220E39}" dt="2022-12-12T17:43:05.408" v="28"/>
+          <ac:picMkLst>
+            <pc:docMk/>
+            <pc:sldMk cId="0" sldId="263"/>
+            <ac:picMk id="5" creationId="{7052F1D4-1F88-1A76-1124-6C0BE7C00B60}"/>
+          </ac:picMkLst>
+        </pc:picChg>
+        <pc:picChg chg="add del mod">
+          <ac:chgData name="Fairbairn, Grant" userId="70424cfb-53ea-4f6b-b8b5-bf19ee344a25" providerId="ADAL" clId="{EC3E304A-B240-4313-A5FB-A0B824220E39}" dt="2022-12-12T17:58:23.968" v="32"/>
+          <ac:picMkLst>
+            <pc:docMk/>
+            <pc:sldMk cId="0" sldId="263"/>
+            <ac:picMk id="6" creationId="{A25FE6F1-6529-B48D-894D-11DE96AFE5FE}"/>
+          </ac:picMkLst>
+        </pc:picChg>
+        <pc:picChg chg="add del mod">
+          <ac:chgData name="Fairbairn, Grant" userId="70424cfb-53ea-4f6b-b8b5-bf19ee344a25" providerId="ADAL" clId="{EC3E304A-B240-4313-A5FB-A0B824220E39}" dt="2022-12-12T19:15:46.219" v="42"/>
+          <ac:picMkLst>
+            <pc:docMk/>
+            <pc:sldMk cId="0" sldId="263"/>
+            <ac:picMk id="7" creationId="{2CA0AA0A-EEFE-B415-92B6-AAA817772EB3}"/>
+          </ac:picMkLst>
+        </pc:picChg>
+      </pc:sldChg>
+      <pc:sldChg chg="addSp delSp modSp modTransition modAnim">
+        <pc:chgData name="Fairbairn, Grant" userId="70424cfb-53ea-4f6b-b8b5-bf19ee344a25" providerId="ADAL" clId="{EC3E304A-B240-4313-A5FB-A0B824220E39}" dt="2022-12-12T19:15:46.219" v="42"/>
+        <pc:sldMkLst>
+          <pc:docMk/>
+          <pc:sldMk cId="0" sldId="266"/>
+        </pc:sldMkLst>
+        <pc:picChg chg="add del mod">
+          <ac:chgData name="Fairbairn, Grant" userId="70424cfb-53ea-4f6b-b8b5-bf19ee344a25" providerId="ADAL" clId="{EC3E304A-B240-4313-A5FB-A0B824220E39}" dt="2022-12-12T16:49:13.281" v="3"/>
+          <ac:picMkLst>
+            <pc:docMk/>
+            <pc:sldMk cId="0" sldId="266"/>
+            <ac:picMk id="2" creationId="{D6E52962-4518-31C6-0107-7C4121B3EF6B}"/>
+          </ac:picMkLst>
+        </pc:picChg>
+        <pc:picChg chg="add del mod">
+          <ac:chgData name="Fairbairn, Grant" userId="70424cfb-53ea-4f6b-b8b5-bf19ee344a25" providerId="ADAL" clId="{EC3E304A-B240-4313-A5FB-A0B824220E39}" dt="2022-12-12T17:26:47.457" v="18"/>
+          <ac:picMkLst>
+            <pc:docMk/>
+            <pc:sldMk cId="0" sldId="266"/>
+            <ac:picMk id="3" creationId="{9BD26E45-D46D-5B38-5E02-C7E4CFDD0CEE}"/>
+          </ac:picMkLst>
+        </pc:picChg>
+        <pc:picChg chg="add del mod">
+          <ac:chgData name="Fairbairn, Grant" userId="70424cfb-53ea-4f6b-b8b5-bf19ee344a25" providerId="ADAL" clId="{EC3E304A-B240-4313-A5FB-A0B824220E39}" dt="2022-12-12T17:27:09.412" v="20"/>
+          <ac:picMkLst>
+            <pc:docMk/>
+            <pc:sldMk cId="0" sldId="266"/>
+            <ac:picMk id="4" creationId="{8E26C32F-7C2D-F4CA-68AA-3DC6FC336CD8}"/>
+          </ac:picMkLst>
+        </pc:picChg>
+        <pc:picChg chg="add del mod">
+          <ac:chgData name="Fairbairn, Grant" userId="70424cfb-53ea-4f6b-b8b5-bf19ee344a25" providerId="ADAL" clId="{EC3E304A-B240-4313-A5FB-A0B824220E39}" dt="2022-12-12T17:42:15.399" v="22"/>
+          <ac:picMkLst>
+            <pc:docMk/>
+            <pc:sldMk cId="0" sldId="266"/>
+            <ac:picMk id="5" creationId="{65C5BA3E-AA46-8381-C59F-FE621DFFE715}"/>
+          </ac:picMkLst>
+        </pc:picChg>
+        <pc:picChg chg="add del mod">
+          <ac:chgData name="Fairbairn, Grant" userId="70424cfb-53ea-4f6b-b8b5-bf19ee344a25" providerId="ADAL" clId="{EC3E304A-B240-4313-A5FB-A0B824220E39}" dt="2022-12-12T17:42:34.260" v="24"/>
+          <ac:picMkLst>
+            <pc:docMk/>
+            <pc:sldMk cId="0" sldId="266"/>
+            <ac:picMk id="6" creationId="{D88237A0-28C9-6EC0-4587-CF5B25115176}"/>
+          </ac:picMkLst>
+        </pc:picChg>
+        <pc:picChg chg="add del mod">
+          <ac:chgData name="Fairbairn, Grant" userId="70424cfb-53ea-4f6b-b8b5-bf19ee344a25" providerId="ADAL" clId="{EC3E304A-B240-4313-A5FB-A0B824220E39}" dt="2022-12-12T17:42:47.088" v="26"/>
+          <ac:picMkLst>
+            <pc:docMk/>
+            <pc:sldMk cId="0" sldId="266"/>
+            <ac:picMk id="7" creationId="{D40D7E36-C2C0-A159-78B4-555DF19BFFB7}"/>
+          </ac:picMkLst>
+        </pc:picChg>
+        <pc:picChg chg="add del mod">
+          <ac:chgData name="Fairbairn, Grant" userId="70424cfb-53ea-4f6b-b8b5-bf19ee344a25" providerId="ADAL" clId="{EC3E304A-B240-4313-A5FB-A0B824220E39}" dt="2022-12-12T17:43:05.408" v="28"/>
+          <ac:picMkLst>
+            <pc:docMk/>
+            <pc:sldMk cId="0" sldId="266"/>
+            <ac:picMk id="8" creationId="{D98B2A17-F56D-98E0-DFB6-429BF0CD0BB1}"/>
+          </ac:picMkLst>
+        </pc:picChg>
+        <pc:picChg chg="add del mod">
+          <ac:chgData name="Fairbairn, Grant" userId="70424cfb-53ea-4f6b-b8b5-bf19ee344a25" providerId="ADAL" clId="{EC3E304A-B240-4313-A5FB-A0B824220E39}" dt="2022-12-12T17:58:23.968" v="32"/>
+          <ac:picMkLst>
+            <pc:docMk/>
+            <pc:sldMk cId="0" sldId="266"/>
+            <ac:picMk id="9" creationId="{E819D27D-260C-3022-53D6-3DD41E25733D}"/>
+          </ac:picMkLst>
+        </pc:picChg>
+        <pc:picChg chg="add del mod">
+          <ac:chgData name="Fairbairn, Grant" userId="70424cfb-53ea-4f6b-b8b5-bf19ee344a25" providerId="ADAL" clId="{EC3E304A-B240-4313-A5FB-A0B824220E39}" dt="2022-12-12T18:14:25.386" v="38"/>
+          <ac:picMkLst>
+            <pc:docMk/>
+            <pc:sldMk cId="0" sldId="266"/>
+            <ac:picMk id="10" creationId="{4C6410DD-6D17-1F2A-FE8E-774D46388FD2}"/>
+          </ac:picMkLst>
+        </pc:picChg>
+        <pc:picChg chg="add del mod">
+          <ac:chgData name="Fairbairn, Grant" userId="70424cfb-53ea-4f6b-b8b5-bf19ee344a25" providerId="ADAL" clId="{EC3E304A-B240-4313-A5FB-A0B824220E39}" dt="2022-12-12T18:14:56.941" v="40"/>
+          <ac:picMkLst>
+            <pc:docMk/>
+            <pc:sldMk cId="0" sldId="266"/>
+            <ac:picMk id="11" creationId="{D5B10E69-A622-F782-771B-B892CB5B8AC5}"/>
+          </ac:picMkLst>
+        </pc:picChg>
+        <pc:picChg chg="add del mod">
+          <ac:chgData name="Fairbairn, Grant" userId="70424cfb-53ea-4f6b-b8b5-bf19ee344a25" providerId="ADAL" clId="{EC3E304A-B240-4313-A5FB-A0B824220E39}" dt="2022-12-12T19:15:46.219" v="42"/>
+          <ac:picMkLst>
+            <pc:docMk/>
+            <pc:sldMk cId="0" sldId="266"/>
+            <ac:picMk id="12" creationId="{3EBCC644-2181-7584-32FA-BA5B8344C50E}"/>
+          </ac:picMkLst>
+        </pc:picChg>
+      </pc:sldChg>
+      <pc:sldChg chg="addSp delSp modSp modTransition modAnim">
+        <pc:chgData name="Fairbairn, Grant" userId="70424cfb-53ea-4f6b-b8b5-bf19ee344a25" providerId="ADAL" clId="{EC3E304A-B240-4313-A5FB-A0B824220E39}" dt="2022-12-12T19:15:46.219" v="42"/>
+        <pc:sldMkLst>
+          <pc:docMk/>
+          <pc:sldMk cId="1638005020" sldId="268"/>
+        </pc:sldMkLst>
+        <pc:picChg chg="add del mod">
+          <ac:chgData name="Fairbairn, Grant" userId="70424cfb-53ea-4f6b-b8b5-bf19ee344a25" providerId="ADAL" clId="{EC3E304A-B240-4313-A5FB-A0B824220E39}" dt="2022-12-12T15:41:53.164" v="1"/>
+          <ac:picMkLst>
+            <pc:docMk/>
+            <pc:sldMk cId="1638005020" sldId="268"/>
+            <ac:picMk id="2" creationId="{354AFAB1-EF1E-5D8F-9E7F-D00902A864B2}"/>
+          </ac:picMkLst>
+        </pc:picChg>
+        <pc:picChg chg="add del mod">
+          <ac:chgData name="Fairbairn, Grant" userId="70424cfb-53ea-4f6b-b8b5-bf19ee344a25" providerId="ADAL" clId="{EC3E304A-B240-4313-A5FB-A0B824220E39}" dt="2022-12-12T16:49:13.281" v="3"/>
+          <ac:picMkLst>
+            <pc:docMk/>
+            <pc:sldMk cId="1638005020" sldId="268"/>
+            <ac:picMk id="3" creationId="{E49F2A19-2973-91E7-2232-C921C9ECAFF1}"/>
+          </ac:picMkLst>
+        </pc:picChg>
+        <pc:picChg chg="add del mod">
+          <ac:chgData name="Fairbairn, Grant" userId="70424cfb-53ea-4f6b-b8b5-bf19ee344a25" providerId="ADAL" clId="{EC3E304A-B240-4313-A5FB-A0B824220E39}" dt="2022-12-12T17:27:09.412" v="20"/>
+          <ac:picMkLst>
+            <pc:docMk/>
+            <pc:sldMk cId="1638005020" sldId="268"/>
+            <ac:picMk id="4" creationId="{B752DF71-287F-F7A9-A170-E4D637A97747}"/>
+          </ac:picMkLst>
+        </pc:picChg>
+        <pc:picChg chg="add del mod">
+          <ac:chgData name="Fairbairn, Grant" userId="70424cfb-53ea-4f6b-b8b5-bf19ee344a25" providerId="ADAL" clId="{EC3E304A-B240-4313-A5FB-A0B824220E39}" dt="2022-12-12T17:43:05.408" v="28"/>
+          <ac:picMkLst>
+            <pc:docMk/>
+            <pc:sldMk cId="1638005020" sldId="268"/>
+            <ac:picMk id="5" creationId="{9E52923A-A0BA-889C-AD27-5FD0F150BD77}"/>
+          </ac:picMkLst>
+        </pc:picChg>
+        <pc:picChg chg="add del mod">
+          <ac:chgData name="Fairbairn, Grant" userId="70424cfb-53ea-4f6b-b8b5-bf19ee344a25" providerId="ADAL" clId="{EC3E304A-B240-4313-A5FB-A0B824220E39}" dt="2022-12-12T17:58:23.968" v="32"/>
+          <ac:picMkLst>
+            <pc:docMk/>
+            <pc:sldMk cId="1638005020" sldId="268"/>
+            <ac:picMk id="6" creationId="{C8C30864-4EE0-3AFA-30AE-44461D6142E9}"/>
+          </ac:picMkLst>
+        </pc:picChg>
+        <pc:picChg chg="add del mod">
+          <ac:chgData name="Fairbairn, Grant" userId="70424cfb-53ea-4f6b-b8b5-bf19ee344a25" providerId="ADAL" clId="{EC3E304A-B240-4313-A5FB-A0B824220E39}" dt="2022-12-12T19:15:46.219" v="42"/>
+          <ac:picMkLst>
+            <pc:docMk/>
+            <pc:sldMk cId="1638005020" sldId="268"/>
+            <ac:picMk id="7" creationId="{EF770BFF-0601-51B8-070B-B4CD6E0CEBAF}"/>
+          </ac:picMkLst>
+        </pc:picChg>
+      </pc:sldChg>
+      <pc:sldChg chg="addSp delSp modSp modTransition modAnim">
+        <pc:chgData name="Fairbairn, Grant" userId="70424cfb-53ea-4f6b-b8b5-bf19ee344a25" providerId="ADAL" clId="{EC3E304A-B240-4313-A5FB-A0B824220E39}" dt="2022-12-12T19:15:46.219" v="42"/>
+        <pc:sldMkLst>
+          <pc:docMk/>
+          <pc:sldMk cId="2836638278" sldId="269"/>
+        </pc:sldMkLst>
+        <pc:picChg chg="add del mod">
+          <ac:chgData name="Fairbairn, Grant" userId="70424cfb-53ea-4f6b-b8b5-bf19ee344a25" providerId="ADAL" clId="{EC3E304A-B240-4313-A5FB-A0B824220E39}" dt="2022-12-12T16:49:13.281" v="3"/>
+          <ac:picMkLst>
+            <pc:docMk/>
+            <pc:sldMk cId="2836638278" sldId="269"/>
+            <ac:picMk id="3" creationId="{E944561F-DA33-5441-C5A5-28412EF845FE}"/>
+          </ac:picMkLst>
+        </pc:picChg>
+        <pc:picChg chg="add del mod">
+          <ac:chgData name="Fairbairn, Grant" userId="70424cfb-53ea-4f6b-b8b5-bf19ee344a25" providerId="ADAL" clId="{EC3E304A-B240-4313-A5FB-A0B824220E39}" dt="2022-12-12T17:27:09.412" v="20"/>
+          <ac:picMkLst>
+            <pc:docMk/>
+            <pc:sldMk cId="2836638278" sldId="269"/>
+            <ac:picMk id="4" creationId="{999FD0E0-83EB-E083-8C35-04E3AF2F3E64}"/>
+          </ac:picMkLst>
+        </pc:picChg>
+        <pc:picChg chg="add del mod">
+          <ac:chgData name="Fairbairn, Grant" userId="70424cfb-53ea-4f6b-b8b5-bf19ee344a25" providerId="ADAL" clId="{EC3E304A-B240-4313-A5FB-A0B824220E39}" dt="2022-12-12T17:43:05.408" v="28"/>
+          <ac:picMkLst>
+            <pc:docMk/>
+            <pc:sldMk cId="2836638278" sldId="269"/>
+            <ac:picMk id="6" creationId="{DD7A186E-764D-C646-334D-AEFA20555FB0}"/>
+          </ac:picMkLst>
+        </pc:picChg>
+        <pc:picChg chg="add del mod">
+          <ac:chgData name="Fairbairn, Grant" userId="70424cfb-53ea-4f6b-b8b5-bf19ee344a25" providerId="ADAL" clId="{EC3E304A-B240-4313-A5FB-A0B824220E39}" dt="2022-12-12T17:58:23.968" v="32"/>
+          <ac:picMkLst>
+            <pc:docMk/>
+            <pc:sldMk cId="2836638278" sldId="269"/>
+            <ac:picMk id="8" creationId="{9E330063-0A24-CED6-6F00-2B3E9305D8D4}"/>
+          </ac:picMkLst>
+        </pc:picChg>
+        <pc:picChg chg="add del mod">
+          <ac:chgData name="Fairbairn, Grant" userId="70424cfb-53ea-4f6b-b8b5-bf19ee344a25" providerId="ADAL" clId="{EC3E304A-B240-4313-A5FB-A0B824220E39}" dt="2022-12-12T19:15:46.219" v="42"/>
+          <ac:picMkLst>
+            <pc:docMk/>
+            <pc:sldMk cId="2836638278" sldId="269"/>
+            <ac:picMk id="9" creationId="{528325BC-EC62-CC5B-E7A9-BFFE6B5CB427}"/>
+          </ac:picMkLst>
+        </pc:picChg>
+      </pc:sldChg>
+      <pc:sldChg chg="addSp delSp modSp modTransition modAnim">
+        <pc:chgData name="Fairbairn, Grant" userId="70424cfb-53ea-4f6b-b8b5-bf19ee344a25" providerId="ADAL" clId="{EC3E304A-B240-4313-A5FB-A0B824220E39}" dt="2022-12-12T19:15:46.219" v="42"/>
+        <pc:sldMkLst>
+          <pc:docMk/>
+          <pc:sldMk cId="2852794292" sldId="270"/>
+        </pc:sldMkLst>
+        <pc:picChg chg="add del mod">
+          <ac:chgData name="Fairbairn, Grant" userId="70424cfb-53ea-4f6b-b8b5-bf19ee344a25" providerId="ADAL" clId="{EC3E304A-B240-4313-A5FB-A0B824220E39}" dt="2022-12-12T16:49:13.281" v="3"/>
+          <ac:picMkLst>
+            <pc:docMk/>
+            <pc:sldMk cId="2852794292" sldId="270"/>
+            <ac:picMk id="2" creationId="{9459F4BF-F7A4-8F71-E6CF-519B83060381}"/>
+          </ac:picMkLst>
+        </pc:picChg>
+        <pc:picChg chg="add del mod">
+          <ac:chgData name="Fairbairn, Grant" userId="70424cfb-53ea-4f6b-b8b5-bf19ee344a25" providerId="ADAL" clId="{EC3E304A-B240-4313-A5FB-A0B824220E39}" dt="2022-12-12T17:27:09.412" v="20"/>
+          <ac:picMkLst>
+            <pc:docMk/>
+            <pc:sldMk cId="2852794292" sldId="270"/>
+            <ac:picMk id="4" creationId="{25480AFE-B021-3F87-7C93-FC227C95E7E0}"/>
+          </ac:picMkLst>
+        </pc:picChg>
+        <pc:picChg chg="add del mod">
+          <ac:chgData name="Fairbairn, Grant" userId="70424cfb-53ea-4f6b-b8b5-bf19ee344a25" providerId="ADAL" clId="{EC3E304A-B240-4313-A5FB-A0B824220E39}" dt="2022-12-12T17:43:05.408" v="28"/>
+          <ac:picMkLst>
+            <pc:docMk/>
+            <pc:sldMk cId="2852794292" sldId="270"/>
+            <ac:picMk id="5" creationId="{BD1B6CC6-2BCB-15B0-987F-E26B75229CBE}"/>
+          </ac:picMkLst>
+        </pc:picChg>
+        <pc:picChg chg="add del mod">
+          <ac:chgData name="Fairbairn, Grant" userId="70424cfb-53ea-4f6b-b8b5-bf19ee344a25" providerId="ADAL" clId="{EC3E304A-B240-4313-A5FB-A0B824220E39}" dt="2022-12-12T17:58:23.968" v="32"/>
+          <ac:picMkLst>
+            <pc:docMk/>
+            <pc:sldMk cId="2852794292" sldId="270"/>
+            <ac:picMk id="6" creationId="{A384CDBC-9A59-F093-81B1-BBBEC346F7DA}"/>
+          </ac:picMkLst>
+        </pc:picChg>
+        <pc:picChg chg="add del mod">
+          <ac:chgData name="Fairbairn, Grant" userId="70424cfb-53ea-4f6b-b8b5-bf19ee344a25" providerId="ADAL" clId="{EC3E304A-B240-4313-A5FB-A0B824220E39}" dt="2022-12-12T19:15:46.219" v="42"/>
+          <ac:picMkLst>
+            <pc:docMk/>
+            <pc:sldMk cId="2852794292" sldId="270"/>
+            <ac:picMk id="7" creationId="{55995ECF-A680-9D10-7A89-3EE3FC45B42D}"/>
+          </ac:picMkLst>
+        </pc:picChg>
+      </pc:sldChg>
+      <pc:sldChg chg="addSp delSp modSp modTransition modAnim">
+        <pc:chgData name="Fairbairn, Grant" userId="70424cfb-53ea-4f6b-b8b5-bf19ee344a25" providerId="ADAL" clId="{EC3E304A-B240-4313-A5FB-A0B824220E39}" dt="2022-12-12T19:15:46.219" v="42"/>
+        <pc:sldMkLst>
+          <pc:docMk/>
+          <pc:sldMk cId="2602999358" sldId="271"/>
+        </pc:sldMkLst>
+        <pc:picChg chg="add del mod">
+          <ac:chgData name="Fairbairn, Grant" userId="70424cfb-53ea-4f6b-b8b5-bf19ee344a25" providerId="ADAL" clId="{EC3E304A-B240-4313-A5FB-A0B824220E39}" dt="2022-12-12T16:49:13.281" v="3"/>
+          <ac:picMkLst>
+            <pc:docMk/>
+            <pc:sldMk cId="2602999358" sldId="271"/>
+            <ac:picMk id="2" creationId="{C2652B72-B8E2-8D7A-777E-529533335FB1}"/>
+          </ac:picMkLst>
+        </pc:picChg>
+        <pc:picChg chg="add del mod">
+          <ac:chgData name="Fairbairn, Grant" userId="70424cfb-53ea-4f6b-b8b5-bf19ee344a25" providerId="ADAL" clId="{EC3E304A-B240-4313-A5FB-A0B824220E39}" dt="2022-12-12T17:27:09.412" v="20"/>
+          <ac:picMkLst>
+            <pc:docMk/>
+            <pc:sldMk cId="2602999358" sldId="271"/>
+            <ac:picMk id="3" creationId="{5696D411-BF3E-75D5-022C-1F244F1E7682}"/>
+          </ac:picMkLst>
+        </pc:picChg>
+        <pc:picChg chg="add del mod">
+          <ac:chgData name="Fairbairn, Grant" userId="70424cfb-53ea-4f6b-b8b5-bf19ee344a25" providerId="ADAL" clId="{EC3E304A-B240-4313-A5FB-A0B824220E39}" dt="2022-12-12T17:43:05.408" v="28"/>
+          <ac:picMkLst>
+            <pc:docMk/>
+            <pc:sldMk cId="2602999358" sldId="271"/>
+            <ac:picMk id="5" creationId="{A5690360-581C-A4D7-3E70-8CC975E4B8CC}"/>
+          </ac:picMkLst>
+        </pc:picChg>
+        <pc:picChg chg="add del mod">
+          <ac:chgData name="Fairbairn, Grant" userId="70424cfb-53ea-4f6b-b8b5-bf19ee344a25" providerId="ADAL" clId="{EC3E304A-B240-4313-A5FB-A0B824220E39}" dt="2022-12-12T17:58:23.968" v="32"/>
+          <ac:picMkLst>
+            <pc:docMk/>
+            <pc:sldMk cId="2602999358" sldId="271"/>
+            <ac:picMk id="7" creationId="{62EFA419-A48A-8204-73C1-A02C2078519D}"/>
+          </ac:picMkLst>
+        </pc:picChg>
+        <pc:picChg chg="add del mod">
+          <ac:chgData name="Fairbairn, Grant" userId="70424cfb-53ea-4f6b-b8b5-bf19ee344a25" providerId="ADAL" clId="{EC3E304A-B240-4313-A5FB-A0B824220E39}" dt="2022-12-12T19:15:46.219" v="42"/>
+          <ac:picMkLst>
+            <pc:docMk/>
+            <pc:sldMk cId="2602999358" sldId="271"/>
+            <ac:picMk id="8" creationId="{C5C873A0-8B7C-D082-CF82-0A25C97D7A5E}"/>
+          </ac:picMkLst>
+        </pc:picChg>
+      </pc:sldChg>
+      <pc:sldChg chg="addSp delSp modSp modTransition modAnim">
+        <pc:chgData name="Fairbairn, Grant" userId="70424cfb-53ea-4f6b-b8b5-bf19ee344a25" providerId="ADAL" clId="{EC3E304A-B240-4313-A5FB-A0B824220E39}" dt="2022-12-12T19:15:46.219" v="42"/>
+        <pc:sldMkLst>
+          <pc:docMk/>
+          <pc:sldMk cId="2510980803" sldId="272"/>
+        </pc:sldMkLst>
+        <pc:picChg chg="add del mod">
+          <ac:chgData name="Fairbairn, Grant" userId="70424cfb-53ea-4f6b-b8b5-bf19ee344a25" providerId="ADAL" clId="{EC3E304A-B240-4313-A5FB-A0B824220E39}" dt="2022-12-12T16:49:13.281" v="3"/>
+          <ac:picMkLst>
+            <pc:docMk/>
+            <pc:sldMk cId="2510980803" sldId="272"/>
+            <ac:picMk id="2" creationId="{0C08C7AD-D3B1-138D-CD41-0E0ADB46BBF4}"/>
+          </ac:picMkLst>
+        </pc:picChg>
+        <pc:picChg chg="add del mod">
+          <ac:chgData name="Fairbairn, Grant" userId="70424cfb-53ea-4f6b-b8b5-bf19ee344a25" providerId="ADAL" clId="{EC3E304A-B240-4313-A5FB-A0B824220E39}" dt="2022-12-12T17:27:09.412" v="20"/>
+          <ac:picMkLst>
+            <pc:docMk/>
+            <pc:sldMk cId="2510980803" sldId="272"/>
+            <ac:picMk id="4" creationId="{F3CA1412-164A-9B3C-18CB-0D0684232DF2}"/>
+          </ac:picMkLst>
+        </pc:picChg>
+        <pc:picChg chg="add del mod">
+          <ac:chgData name="Fairbairn, Grant" userId="70424cfb-53ea-4f6b-b8b5-bf19ee344a25" providerId="ADAL" clId="{EC3E304A-B240-4313-A5FB-A0B824220E39}" dt="2022-12-12T17:43:05.408" v="28"/>
+          <ac:picMkLst>
+            <pc:docMk/>
+            <pc:sldMk cId="2510980803" sldId="272"/>
+            <ac:picMk id="5" creationId="{49A244F6-5B64-2D8C-5A8A-C56DADCB40B4}"/>
+          </ac:picMkLst>
+        </pc:picChg>
+        <pc:picChg chg="add del mod">
+          <ac:chgData name="Fairbairn, Grant" userId="70424cfb-53ea-4f6b-b8b5-bf19ee344a25" providerId="ADAL" clId="{EC3E304A-B240-4313-A5FB-A0B824220E39}" dt="2022-12-12T17:58:23.968" v="32"/>
+          <ac:picMkLst>
+            <pc:docMk/>
+            <pc:sldMk cId="2510980803" sldId="272"/>
+            <ac:picMk id="6" creationId="{85868C6E-44EA-3DE6-8BEC-5F11F056E337}"/>
+          </ac:picMkLst>
+        </pc:picChg>
+        <pc:picChg chg="add del mod">
+          <ac:chgData name="Fairbairn, Grant" userId="70424cfb-53ea-4f6b-b8b5-bf19ee344a25" providerId="ADAL" clId="{EC3E304A-B240-4313-A5FB-A0B824220E39}" dt="2022-12-12T19:15:46.219" v="42"/>
+          <ac:picMkLst>
+            <pc:docMk/>
+            <pc:sldMk cId="2510980803" sldId="272"/>
+            <ac:picMk id="8" creationId="{F3FF346A-B9B6-514A-6B19-62BD4C9A2ABD}"/>
+          </ac:picMkLst>
+        </pc:picChg>
+      </pc:sldChg>
+      <pc:sldChg chg="addSp delSp modSp mod modTransition modAnim">
+        <pc:chgData name="Fairbairn, Grant" userId="70424cfb-53ea-4f6b-b8b5-bf19ee344a25" providerId="ADAL" clId="{EC3E304A-B240-4313-A5FB-A0B824220E39}" dt="2022-12-12T19:15:46.219" v="42"/>
+        <pc:sldMkLst>
+          <pc:docMk/>
+          <pc:sldMk cId="518223651" sldId="274"/>
+        </pc:sldMkLst>
+        <pc:spChg chg="mod">
+          <ac:chgData name="Fairbairn, Grant" userId="70424cfb-53ea-4f6b-b8b5-bf19ee344a25" providerId="ADAL" clId="{EC3E304A-B240-4313-A5FB-A0B824220E39}" dt="2022-12-12T16:49:35.536" v="11" actId="20577"/>
+          <ac:spMkLst>
+            <pc:docMk/>
+            <pc:sldMk cId="518223651" sldId="274"/>
+            <ac:spMk id="267" creationId="{00000000-0000-0000-0000-000000000000}"/>
+          </ac:spMkLst>
+        </pc:spChg>
+        <pc:picChg chg="add del mod">
+          <ac:chgData name="Fairbairn, Grant" userId="70424cfb-53ea-4f6b-b8b5-bf19ee344a25" providerId="ADAL" clId="{EC3E304A-B240-4313-A5FB-A0B824220E39}" dt="2022-12-12T16:49:13.281" v="3"/>
+          <ac:picMkLst>
+            <pc:docMk/>
+            <pc:sldMk cId="518223651" sldId="274"/>
+            <ac:picMk id="3" creationId="{6269F66E-40B8-327A-CFCA-8D4D93D1346F}"/>
+          </ac:picMkLst>
+        </pc:picChg>
+        <pc:picChg chg="add del mod">
+          <ac:chgData name="Fairbairn, Grant" userId="70424cfb-53ea-4f6b-b8b5-bf19ee344a25" providerId="ADAL" clId="{EC3E304A-B240-4313-A5FB-A0B824220E39}" dt="2022-12-12T17:27:09.412" v="20"/>
+          <ac:picMkLst>
+            <pc:docMk/>
+            <pc:sldMk cId="518223651" sldId="274"/>
+            <ac:picMk id="5" creationId="{3B01ADC1-C02A-BFAA-5E12-24C4607E19FB}"/>
+          </ac:picMkLst>
+        </pc:picChg>
+        <pc:picChg chg="add del mod">
+          <ac:chgData name="Fairbairn, Grant" userId="70424cfb-53ea-4f6b-b8b5-bf19ee344a25" providerId="ADAL" clId="{EC3E304A-B240-4313-A5FB-A0B824220E39}" dt="2022-12-12T17:43:05.408" v="28"/>
+          <ac:picMkLst>
+            <pc:docMk/>
+            <pc:sldMk cId="518223651" sldId="274"/>
+            <ac:picMk id="7" creationId="{AD66BC7A-A28B-ACE5-BEE3-C7FC48D9F212}"/>
+          </ac:picMkLst>
+        </pc:picChg>
+        <pc:picChg chg="add del mod">
+          <ac:chgData name="Fairbairn, Grant" userId="70424cfb-53ea-4f6b-b8b5-bf19ee344a25" providerId="ADAL" clId="{EC3E304A-B240-4313-A5FB-A0B824220E39}" dt="2022-12-12T17:58:23.968" v="32"/>
+          <ac:picMkLst>
+            <pc:docMk/>
+            <pc:sldMk cId="518223651" sldId="274"/>
+            <ac:picMk id="8" creationId="{C20D5E94-70EB-99DA-16CD-18609A18CF07}"/>
+          </ac:picMkLst>
+        </pc:picChg>
+        <pc:picChg chg="add del mod">
+          <ac:chgData name="Fairbairn, Grant" userId="70424cfb-53ea-4f6b-b8b5-bf19ee344a25" providerId="ADAL" clId="{EC3E304A-B240-4313-A5FB-A0B824220E39}" dt="2022-12-12T19:15:46.219" v="42"/>
+          <ac:picMkLst>
+            <pc:docMk/>
+            <pc:sldMk cId="518223651" sldId="274"/>
+            <ac:picMk id="9" creationId="{F4F931C0-C644-6888-1D43-07A89312A6F8}"/>
+          </ac:picMkLst>
+        </pc:picChg>
+      </pc:sldChg>
+      <pc:sldChg chg="addSp delSp modSp modTransition modAnim">
+        <pc:chgData name="Fairbairn, Grant" userId="70424cfb-53ea-4f6b-b8b5-bf19ee344a25" providerId="ADAL" clId="{EC3E304A-B240-4313-A5FB-A0B824220E39}" dt="2022-12-12T19:15:46.219" v="42"/>
+        <pc:sldMkLst>
+          <pc:docMk/>
+          <pc:sldMk cId="2099771068" sldId="275"/>
+        </pc:sldMkLst>
+        <pc:picChg chg="add del mod">
+          <ac:chgData name="Fairbairn, Grant" userId="70424cfb-53ea-4f6b-b8b5-bf19ee344a25" providerId="ADAL" clId="{EC3E304A-B240-4313-A5FB-A0B824220E39}" dt="2022-12-12T16:49:13.281" v="3"/>
+          <ac:picMkLst>
+            <pc:docMk/>
+            <pc:sldMk cId="2099771068" sldId="275"/>
+            <ac:picMk id="3" creationId="{D9CBD37A-025A-6FE7-1DCA-E45138AB60B7}"/>
+          </ac:picMkLst>
+        </pc:picChg>
+        <pc:picChg chg="add del mod">
+          <ac:chgData name="Fairbairn, Grant" userId="70424cfb-53ea-4f6b-b8b5-bf19ee344a25" providerId="ADAL" clId="{EC3E304A-B240-4313-A5FB-A0B824220E39}" dt="2022-12-12T17:27:09.412" v="20"/>
+          <ac:picMkLst>
+            <pc:docMk/>
+            <pc:sldMk cId="2099771068" sldId="275"/>
+            <ac:picMk id="4" creationId="{677461A4-B9F4-8B3E-62FB-2AFC44E99E49}"/>
+          </ac:picMkLst>
+        </pc:picChg>
+        <pc:picChg chg="add del mod">
+          <ac:chgData name="Fairbairn, Grant" userId="70424cfb-53ea-4f6b-b8b5-bf19ee344a25" providerId="ADAL" clId="{EC3E304A-B240-4313-A5FB-A0B824220E39}" dt="2022-12-12T17:43:05.408" v="28"/>
+          <ac:picMkLst>
+            <pc:docMk/>
+            <pc:sldMk cId="2099771068" sldId="275"/>
+            <ac:picMk id="6" creationId="{7FCB5F1F-1C09-ECA2-65A9-C5B062AE5C86}"/>
+          </ac:picMkLst>
+        </pc:picChg>
+        <pc:picChg chg="add del mod">
+          <ac:chgData name="Fairbairn, Grant" userId="70424cfb-53ea-4f6b-b8b5-bf19ee344a25" providerId="ADAL" clId="{EC3E304A-B240-4313-A5FB-A0B824220E39}" dt="2022-12-12T17:58:23.968" v="32"/>
+          <ac:picMkLst>
+            <pc:docMk/>
+            <pc:sldMk cId="2099771068" sldId="275"/>
+            <ac:picMk id="7" creationId="{7668DBF6-7197-2084-31BF-3F8A7539CA4B}"/>
+          </ac:picMkLst>
+        </pc:picChg>
+        <pc:picChg chg="add del mod">
+          <ac:chgData name="Fairbairn, Grant" userId="70424cfb-53ea-4f6b-b8b5-bf19ee344a25" providerId="ADAL" clId="{EC3E304A-B240-4313-A5FB-A0B824220E39}" dt="2022-12-12T19:15:46.219" v="42"/>
+          <ac:picMkLst>
+            <pc:docMk/>
+            <pc:sldMk cId="2099771068" sldId="275"/>
+            <ac:picMk id="9" creationId="{0FF2EBF5-94C7-4F83-F739-F6125B1521C0}"/>
+          </ac:picMkLst>
+        </pc:picChg>
+      </pc:sldChg>
+      <pc:sldChg chg="addSp delSp modSp modTransition modAnim">
+        <pc:chgData name="Fairbairn, Grant" userId="70424cfb-53ea-4f6b-b8b5-bf19ee344a25" providerId="ADAL" clId="{EC3E304A-B240-4313-A5FB-A0B824220E39}" dt="2022-12-12T19:15:46.219" v="42"/>
+        <pc:sldMkLst>
+          <pc:docMk/>
+          <pc:sldMk cId="2393251964" sldId="276"/>
+        </pc:sldMkLst>
+        <pc:picChg chg="add del mod">
+          <ac:chgData name="Fairbairn, Grant" userId="70424cfb-53ea-4f6b-b8b5-bf19ee344a25" providerId="ADAL" clId="{EC3E304A-B240-4313-A5FB-A0B824220E39}" dt="2022-12-12T16:49:13.281" v="3"/>
+          <ac:picMkLst>
+            <pc:docMk/>
+            <pc:sldMk cId="2393251964" sldId="276"/>
+            <ac:picMk id="3" creationId="{B05D11B7-FCC6-D9E8-FBC8-20CC290392BF}"/>
+          </ac:picMkLst>
+        </pc:picChg>
+        <pc:picChg chg="add del mod">
+          <ac:chgData name="Fairbairn, Grant" userId="70424cfb-53ea-4f6b-b8b5-bf19ee344a25" providerId="ADAL" clId="{EC3E304A-B240-4313-A5FB-A0B824220E39}" dt="2022-12-12T17:27:09.412" v="20"/>
+          <ac:picMkLst>
+            <pc:docMk/>
+            <pc:sldMk cId="2393251964" sldId="276"/>
+            <ac:picMk id="4" creationId="{44BE72EC-4033-DF44-CE48-E1A1C8A06482}"/>
+          </ac:picMkLst>
+        </pc:picChg>
+        <pc:picChg chg="add del mod">
+          <ac:chgData name="Fairbairn, Grant" userId="70424cfb-53ea-4f6b-b8b5-bf19ee344a25" providerId="ADAL" clId="{EC3E304A-B240-4313-A5FB-A0B824220E39}" dt="2022-12-12T17:43:05.408" v="28"/>
+          <ac:picMkLst>
+            <pc:docMk/>
+            <pc:sldMk cId="2393251964" sldId="276"/>
+            <ac:picMk id="5" creationId="{EFAC1485-4307-5FB5-CACB-475E55913481}"/>
+          </ac:picMkLst>
+        </pc:picChg>
+        <pc:picChg chg="add del mod">
+          <ac:chgData name="Fairbairn, Grant" userId="70424cfb-53ea-4f6b-b8b5-bf19ee344a25" providerId="ADAL" clId="{EC3E304A-B240-4313-A5FB-A0B824220E39}" dt="2022-12-12T17:58:23.968" v="32"/>
+          <ac:picMkLst>
+            <pc:docMk/>
+            <pc:sldMk cId="2393251964" sldId="276"/>
+            <ac:picMk id="6" creationId="{281864FA-535B-79AA-55EE-CBA3CC9ECCDC}"/>
+          </ac:picMkLst>
+        </pc:picChg>
+        <pc:picChg chg="add del mod">
+          <ac:chgData name="Fairbairn, Grant" userId="70424cfb-53ea-4f6b-b8b5-bf19ee344a25" providerId="ADAL" clId="{EC3E304A-B240-4313-A5FB-A0B824220E39}" dt="2022-12-12T19:15:46.219" v="42"/>
+          <ac:picMkLst>
+            <pc:docMk/>
+            <pc:sldMk cId="2393251964" sldId="276"/>
+            <ac:picMk id="7" creationId="{A6A23059-F83E-E620-39EA-D53262DFBD14}"/>
+          </ac:picMkLst>
+        </pc:picChg>
+      </pc:sldChg>
+    </pc:docChg>
+  </pc:docChgLst>
+</pc:chgInfo>
 </file>
 
 <file path=ppt/notesMasters/notesMaster1.xml><?xml version="1.0" encoding="utf-8"?>
@@ -14976,13 +15745,13 @@
   <p:clrMapOvr>
     <a:masterClrMapping/>
   </p:clrMapOvr>
-  <mc:AlternateContent xmlns:mc="http://schemas.openxmlformats.org/markup-compatibility/2006" xmlns:p14="http://schemas.microsoft.com/office/powerpoint/2010/main">
-    <mc:Choice Requires="p14">
+  <mc:AlternateContent xmlns:mc="http://schemas.openxmlformats.org/markup-compatibility/2006">
+    <mc:Choice xmlns:p14="http://schemas.microsoft.com/office/powerpoint/2010/main" Requires="p14">
       <p:transition spd="med" p14:dur="700">
         <p:fade/>
       </p:transition>
     </mc:Choice>
-    <mc:Fallback xmlns="" xmlns:p15="http://schemas.microsoft.com/office/powerpoint/2012/main">
+    <mc:Fallback>
       <p:transition spd="med">
         <p:fade/>
       </p:transition>
@@ -15130,7 +15899,7 @@
                 <a:latin typeface="Gill Sans MT"/>
                 <a:ea typeface="DejaVu Sans"/>
               </a:rPr>
-              <a:t>The two linear regression models each exceeded 95% accuracy.</a:t>
+              <a:t>The two logistic regression models each exceeded 95% accuracy.</a:t>
             </a:r>
           </a:p>
           <a:p>
@@ -16461,13 +17230,13 @@
   <p:clrMapOvr>
     <a:masterClrMapping/>
   </p:clrMapOvr>
-  <mc:AlternateContent xmlns:mc="http://schemas.openxmlformats.org/markup-compatibility/2006" xmlns:p14="http://schemas.microsoft.com/office/powerpoint/2010/main">
-    <mc:Choice Requires="p14">
+  <mc:AlternateContent xmlns:mc="http://schemas.openxmlformats.org/markup-compatibility/2006">
+    <mc:Choice xmlns:p14="http://schemas.microsoft.com/office/powerpoint/2010/main" Requires="p14">
       <p:transition spd="med" p14:dur="700">
         <p:fade/>
       </p:transition>
     </mc:Choice>
-    <mc:Fallback xmlns="" xmlns:p15="http://schemas.microsoft.com/office/powerpoint/2012/main">
+    <mc:Fallback>
       <p:transition spd="med">
         <p:fade/>
       </p:transition>
@@ -17176,13 +17945,13 @@
   <p:clrMapOvr>
     <a:masterClrMapping/>
   </p:clrMapOvr>
-  <mc:AlternateContent xmlns:mc="http://schemas.openxmlformats.org/markup-compatibility/2006" xmlns:p14="http://schemas.microsoft.com/office/powerpoint/2010/main">
-    <mc:Choice Requires="p14">
+  <mc:AlternateContent xmlns:mc="http://schemas.openxmlformats.org/markup-compatibility/2006">
+    <mc:Choice xmlns:p14="http://schemas.microsoft.com/office/powerpoint/2010/main" Requires="p14">
       <p:transition spd="med" p14:dur="700">
         <p:fade/>
       </p:transition>
     </mc:Choice>
-    <mc:Fallback xmlns="" xmlns:p15="http://schemas.microsoft.com/office/powerpoint/2012/main">
+    <mc:Fallback>
       <p:transition spd="med">
         <p:fade/>
       </p:transition>
@@ -17889,13 +18658,13 @@
   <p:clrMapOvr>
     <a:masterClrMapping/>
   </p:clrMapOvr>
-  <mc:AlternateContent xmlns:mc="http://schemas.openxmlformats.org/markup-compatibility/2006" xmlns:p14="http://schemas.microsoft.com/office/powerpoint/2010/main">
-    <mc:Choice Requires="p14">
+  <mc:AlternateContent xmlns:mc="http://schemas.openxmlformats.org/markup-compatibility/2006">
+    <mc:Choice xmlns:p14="http://schemas.microsoft.com/office/powerpoint/2010/main" Requires="p14">
       <p:transition spd="med" p14:dur="700">
         <p:fade/>
       </p:transition>
     </mc:Choice>
-    <mc:Fallback xmlns="" xmlns:p15="http://schemas.microsoft.com/office/powerpoint/2012/main">
+    <mc:Fallback>
       <p:transition spd="med">
         <p:fade/>
       </p:transition>
@@ -18716,13 +19485,13 @@
   <p:clrMapOvr>
     <a:masterClrMapping/>
   </p:clrMapOvr>
-  <mc:AlternateContent xmlns:mc="http://schemas.openxmlformats.org/markup-compatibility/2006" xmlns:p14="http://schemas.microsoft.com/office/powerpoint/2010/main">
-    <mc:Choice Requires="p14">
+  <mc:AlternateContent xmlns:mc="http://schemas.openxmlformats.org/markup-compatibility/2006">
+    <mc:Choice xmlns:p14="http://schemas.microsoft.com/office/powerpoint/2010/main" Requires="p14">
       <p:transition spd="med" p14:dur="700">
         <p:fade/>
       </p:transition>
     </mc:Choice>
-    <mc:Fallback xmlns="" xmlns:p15="http://schemas.microsoft.com/office/powerpoint/2012/main">
+    <mc:Fallback>
       <p:transition spd="med">
         <p:fade/>
       </p:transition>
@@ -20389,13 +21158,13 @@
   <p:clrMapOvr>
     <a:masterClrMapping/>
   </p:clrMapOvr>
-  <mc:AlternateContent xmlns:mc="http://schemas.openxmlformats.org/markup-compatibility/2006" xmlns:p14="http://schemas.microsoft.com/office/powerpoint/2010/main">
-    <mc:Choice Requires="p14">
+  <mc:AlternateContent xmlns:mc="http://schemas.openxmlformats.org/markup-compatibility/2006">
+    <mc:Choice xmlns:p14="http://schemas.microsoft.com/office/powerpoint/2010/main" Requires="p14">
       <p:transition spd="med" p14:dur="700">
         <p:fade/>
       </p:transition>
     </mc:Choice>
-    <mc:Fallback xmlns="" xmlns:p15="http://schemas.microsoft.com/office/powerpoint/2012/main">
+    <mc:Fallback>
       <p:transition spd="med">
         <p:fade/>
       </p:transition>

</xml_diff>